<commit_message>
Issue 864: Update orientation guide to reflect switch to TestNG and patch workflow Update Issue 864
</commit_message>
<xml_diff>
--- a/doc/diagrams/RolesAndTechnologies.pptx
+++ b/doc/diagrams/RolesAndTechnologies.pptx
@@ -192,7 +192,7 @@
           <a:p>
             <a:fld id="{EB56B9F1-9881-483D-AC17-B3C6E9A32E68}" type="datetimeFigureOut">
               <a:rPr lang="en-SG" smtClean="0"/>
-              <a:t>17/12/2012</a:t>
+              <a:t>18/5/2013</a:t>
             </a:fld>
             <a:endParaRPr lang="en-SG"/>
           </a:p>
@@ -731,7 +731,7 @@
             <a:fld id="{1D8BD707-D9CF-40AE-B4C6-C98DA3205C09}" type="datetimeFigureOut">
               <a:rPr lang="en-US" smtClean="0"/>
               <a:pPr/>
-              <a:t>12/17/2012</a:t>
+              <a:t>5/18/2013</a:t>
             </a:fld>
             <a:endParaRPr lang="en-US"/>
           </a:p>
@@ -898,7 +898,7 @@
             <a:fld id="{1D8BD707-D9CF-40AE-B4C6-C98DA3205C09}" type="datetimeFigureOut">
               <a:rPr lang="en-US" smtClean="0"/>
               <a:pPr/>
-              <a:t>12/17/2012</a:t>
+              <a:t>5/18/2013</a:t>
             </a:fld>
             <a:endParaRPr lang="en-US"/>
           </a:p>
@@ -1075,7 +1075,7 @@
             <a:fld id="{1D8BD707-D9CF-40AE-B4C6-C98DA3205C09}" type="datetimeFigureOut">
               <a:rPr lang="en-US" smtClean="0"/>
               <a:pPr/>
-              <a:t>12/17/2012</a:t>
+              <a:t>5/18/2013</a:t>
             </a:fld>
             <a:endParaRPr lang="en-US"/>
           </a:p>
@@ -1242,7 +1242,7 @@
             <a:fld id="{1D8BD707-D9CF-40AE-B4C6-C98DA3205C09}" type="datetimeFigureOut">
               <a:rPr lang="en-US" smtClean="0"/>
               <a:pPr/>
-              <a:t>12/17/2012</a:t>
+              <a:t>5/18/2013</a:t>
             </a:fld>
             <a:endParaRPr lang="en-US"/>
           </a:p>
@@ -1485,7 +1485,7 @@
             <a:fld id="{1D8BD707-D9CF-40AE-B4C6-C98DA3205C09}" type="datetimeFigureOut">
               <a:rPr lang="en-US" smtClean="0"/>
               <a:pPr/>
-              <a:t>12/17/2012</a:t>
+              <a:t>5/18/2013</a:t>
             </a:fld>
             <a:endParaRPr lang="en-US"/>
           </a:p>
@@ -1770,7 +1770,7 @@
             <a:fld id="{1D8BD707-D9CF-40AE-B4C6-C98DA3205C09}" type="datetimeFigureOut">
               <a:rPr lang="en-US" smtClean="0"/>
               <a:pPr/>
-              <a:t>12/17/2012</a:t>
+              <a:t>5/18/2013</a:t>
             </a:fld>
             <a:endParaRPr lang="en-US"/>
           </a:p>
@@ -2189,7 +2189,7 @@
             <a:fld id="{1D8BD707-D9CF-40AE-B4C6-C98DA3205C09}" type="datetimeFigureOut">
               <a:rPr lang="en-US" smtClean="0"/>
               <a:pPr/>
-              <a:t>12/17/2012</a:t>
+              <a:t>5/18/2013</a:t>
             </a:fld>
             <a:endParaRPr lang="en-US"/>
           </a:p>
@@ -2304,7 +2304,7 @@
             <a:fld id="{1D8BD707-D9CF-40AE-B4C6-C98DA3205C09}" type="datetimeFigureOut">
               <a:rPr lang="en-US" smtClean="0"/>
               <a:pPr/>
-              <a:t>12/17/2012</a:t>
+              <a:t>5/18/2013</a:t>
             </a:fld>
             <a:endParaRPr lang="en-US"/>
           </a:p>
@@ -2396,7 +2396,7 @@
             <a:fld id="{1D8BD707-D9CF-40AE-B4C6-C98DA3205C09}" type="datetimeFigureOut">
               <a:rPr lang="en-US" smtClean="0"/>
               <a:pPr/>
-              <a:t>12/17/2012</a:t>
+              <a:t>5/18/2013</a:t>
             </a:fld>
             <a:endParaRPr lang="en-US"/>
           </a:p>
@@ -2670,7 +2670,7 @@
             <a:fld id="{1D8BD707-D9CF-40AE-B4C6-C98DA3205C09}" type="datetimeFigureOut">
               <a:rPr lang="en-US" smtClean="0"/>
               <a:pPr/>
-              <a:t>12/17/2012</a:t>
+              <a:t>5/18/2013</a:t>
             </a:fld>
             <a:endParaRPr lang="en-US"/>
           </a:p>
@@ -2920,7 +2920,7 @@
             <a:fld id="{1D8BD707-D9CF-40AE-B4C6-C98DA3205C09}" type="datetimeFigureOut">
               <a:rPr lang="en-US" smtClean="0"/>
               <a:pPr/>
-              <a:t>12/17/2012</a:t>
+              <a:t>5/18/2013</a:t>
             </a:fld>
             <a:endParaRPr lang="en-US"/>
           </a:p>
@@ -3130,7 +3130,7 @@
             <a:fld id="{1D8BD707-D9CF-40AE-B4C6-C98DA3205C09}" type="datetimeFigureOut">
               <a:rPr lang="en-US" smtClean="0"/>
               <a:pPr/>
-              <a:t>12/17/2012</a:t>
+              <a:t>5/18/2013</a:t>
             </a:fld>
             <a:endParaRPr lang="en-US"/>
           </a:p>
@@ -3932,14 +3932,14 @@
               <a:t>     Java, </a:t>
             </a:r>
             <a:r>
-              <a:rPr lang="en-US" sz="1400" b="1" dirty="0" err="1" smtClean="0">
+              <a:rPr lang="en-US" sz="1400" b="1" smtClean="0">
                 <a:solidFill>
                   <a:schemeClr val="tx1"/>
                 </a:solidFill>
                 <a:latin typeface="Consolas" pitchFamily="49" charset="0"/>
                 <a:cs typeface="Consolas" pitchFamily="49" charset="0"/>
               </a:rPr>
-              <a:t>JUnit</a:t>
+              <a:t>TestNG</a:t>
             </a:r>
             <a:endParaRPr lang="en-SG" sz="1400" b="1" dirty="0">
               <a:solidFill>

</xml_diff>